<commit_message>
Final version, as presented
</commit_message>
<xml_diff>
--- a/demos/nonnull-interned-demo/checkers-demo-200911-devoxx.pptx
+++ b/demos/nonnull-interned-demo/checkers-demo-200911-devoxx.pptx
@@ -231,7 +231,7 @@
             <a:fld id="{F1CB0A62-8E67-4C9C-BD0A-1B623B6FF41A}" type="datetimeFigureOut">
               <a:rPr lang="en-US" smtClean="0"/>
               <a:pPr/>
-              <a:t>11/17/2009</a:t>
+              <a:t>11/19/2009</a:t>
             </a:fld>
             <a:endParaRPr lang="en-US"/>
           </a:p>
@@ -393,7 +393,7 @@
             <a:fld id="{7E352BF5-329B-4DBF-99DF-ACF46ECAA31D}" type="datetimeFigureOut">
               <a:rPr lang="en-US" smtClean="0"/>
               <a:pPr/>
-              <a:t>11/17/2009</a:t>
+              <a:t>11/19/2009</a:t>
             </a:fld>
             <a:endParaRPr lang="en-US"/>
           </a:p>
@@ -1396,7 +1396,7 @@
             <a:fld id="{68E1BC78-26EE-F449-AB4E-4B63390B0AE5}" type="datetimeFigureOut">
               <a:rPr lang="nl-NL" smtClean="0"/>
               <a:pPr/>
-              <a:t>17-11-2009</a:t>
+              <a:t>19-11-2009</a:t>
             </a:fld>
             <a:endParaRPr lang="nl-NL"/>
           </a:p>
@@ -1711,7 +1711,7 @@
             <a:fld id="{68E1BC78-26EE-F449-AB4E-4B63390B0AE5}" type="datetimeFigureOut">
               <a:rPr lang="nl-NL" smtClean="0"/>
               <a:pPr/>
-              <a:t>17-11-2009</a:t>
+              <a:t>19-11-2009</a:t>
             </a:fld>
             <a:endParaRPr lang="nl-NL"/>
           </a:p>
@@ -2080,7 +2080,7 @@
             <a:fld id="{68E1BC78-26EE-F449-AB4E-4B63390B0AE5}" type="datetimeFigureOut">
               <a:rPr lang="nl-NL" smtClean="0"/>
               <a:pPr/>
-              <a:t>17-11-2009</a:t>
+              <a:t>19-11-2009</a:t>
             </a:fld>
             <a:endParaRPr lang="nl-NL" dirty="0"/>
           </a:p>
@@ -2563,7 +2563,7 @@
             </a:br>
             <a:r>
               <a:rPr lang="en-US" sz="4400" b="1" dirty="0" smtClean="0"/>
-              <a:t>with pluggable type checking</a:t>
+              <a:t>with pluggable type-checking</a:t>
             </a:r>
             <a:endParaRPr kumimoji="0" lang="nl-NL" sz="4400" b="1" i="0" u="none" strike="noStrike" kern="1200" cap="all" spc="0" normalizeH="0" baseline="0" noProof="0" dirty="0">
               <a:ln>
@@ -3376,14 +3376,7 @@
                 <a:latin typeface="Courier New" pitchFamily="49" charset="0"/>
                 <a:cs typeface="Courier New" pitchFamily="49" charset="0"/>
               </a:rPr>
-              <a:t>@</a:t>
-            </a:r>
-            <a:r>
-              <a:rPr lang="en-US" sz="3000" b="1" dirty="0" err="1" smtClean="0">
-                <a:latin typeface="Courier New" pitchFamily="49" charset="0"/>
-                <a:cs typeface="Courier New" pitchFamily="49" charset="0"/>
-              </a:rPr>
-              <a:t>GuardedBy</a:t>
+              <a:t>@Untainted</a:t>
             </a:r>
             <a:endParaRPr kumimoji="0" lang="en-US" sz="3200" b="0" i="0" u="none" strike="noStrike" kern="1200" cap="none" spc="0" normalizeH="0" baseline="0" noProof="0" dirty="0" smtClean="0">
               <a:ln>
@@ -3914,7 +3907,7 @@
           <a:p>
             <a:r>
               <a:rPr lang="en-US" dirty="0" smtClean="0"/>
-              <a:t>Use familiar error messages</a:t>
+              <a:t>Uses familiar error messages</a:t>
             </a:r>
           </a:p>
           <a:p>
@@ -3943,10 +3936,23 @@
                 <a:latin typeface="Courier New" pitchFamily="49" charset="0"/>
                 <a:cs typeface="Courier New" pitchFamily="49" charset="0"/>
               </a:rPr>
-              <a:t> –processor </a:t>
-            </a:r>
-            <a:r>
-              <a:rPr lang="en-US" sz="2600" b="1" u="sng" dirty="0" err="1" smtClean="0">
+              <a:t> </a:t>
+            </a:r>
+            <a:r>
+              <a:rPr lang="en-US" sz="2600" b="1" dirty="0" smtClean="0">
+                <a:solidFill>
+                  <a:srgbClr val="FF0000"/>
+                </a:solidFill>
+                <a:latin typeface="Courier New" pitchFamily="49" charset="0"/>
+                <a:cs typeface="Courier New" pitchFamily="49" charset="0"/>
+              </a:rPr>
+              <a:t>–processor </a:t>
+            </a:r>
+            <a:r>
+              <a:rPr lang="en-US" sz="2600" b="1" dirty="0" err="1" smtClean="0">
+                <a:solidFill>
+                  <a:srgbClr val="FF0000"/>
+                </a:solidFill>
                 <a:latin typeface="Courier New" pitchFamily="49" charset="0"/>
                 <a:cs typeface="Courier New" pitchFamily="49" charset="0"/>
               </a:rPr>
@@ -3954,10 +3960,20 @@
             </a:r>
             <a:r>
               <a:rPr lang="en-US" sz="2600" b="1" dirty="0" smtClean="0">
-                <a:latin typeface="Courier New" pitchFamily="49" charset="0"/>
-                <a:cs typeface="Courier New" pitchFamily="49" charset="0"/>
-              </a:rPr>
-              <a:t> MyFile.java</a:t>
+                <a:solidFill>
+                  <a:srgbClr val="FF0000"/>
+                </a:solidFill>
+                <a:latin typeface="Courier New" pitchFamily="49" charset="0"/>
+                <a:cs typeface="Courier New" pitchFamily="49" charset="0"/>
+              </a:rPr>
+              <a:t> </a:t>
+            </a:r>
+            <a:r>
+              <a:rPr lang="en-US" sz="2600" b="1" dirty="0" smtClean="0">
+                <a:latin typeface="Courier New" pitchFamily="49" charset="0"/>
+                <a:cs typeface="Courier New" pitchFamily="49" charset="0"/>
+              </a:rPr>
+              <a:t>MyFile.java</a:t>
             </a:r>
             <a:endParaRPr lang="en-US" sz="2800" b="1" dirty="0" smtClean="0">
               <a:latin typeface="Courier New" pitchFamily="49" charset="0"/>
@@ -4198,8 +4214,8 @@
         </p:blipFill>
         <p:spPr bwMode="auto">
           <a:xfrm>
-            <a:off x="1368879" y="3371850"/>
-            <a:ext cx="4940300" cy="2781300"/>
+            <a:off x="1074589" y="3219958"/>
+            <a:ext cx="6219590" cy="3501517"/>
           </a:xfrm>
           <a:prstGeom prst="rect">
             <a:avLst/>
@@ -7058,25 +7074,7 @@
               <a:rPr lang="en-US" sz="2400" dirty="0" smtClean="0">
                 <a:latin typeface="Calibri" pitchFamily="34" charset="0"/>
               </a:rPr>
-              <a:t>Also, </a:t>
-            </a:r>
-            <a:r>
-              <a:rPr lang="en-US" sz="2400" dirty="0" smtClean="0">
-                <a:latin typeface="Calibri" pitchFamily="34" charset="0"/>
-              </a:rPr>
-              <a:t>errors in </a:t>
-            </a:r>
-            <a:r>
-              <a:rPr lang="en-US" sz="2400" dirty="0" smtClean="0">
-                <a:latin typeface="Calibri" pitchFamily="34" charset="0"/>
-              </a:rPr>
-              <a:t>Google Collections </a:t>
-            </a:r>
-            <a:r>
-              <a:rPr lang="en-US" sz="2400" dirty="0" smtClean="0">
-                <a:latin typeface="Calibri" pitchFamily="34" charset="0"/>
-              </a:rPr>
-              <a:t>(&gt;20,000 tests, </a:t>
+              <a:t>Also, errors in Google Collections (&gt;20,000 tests, </a:t>
             </a:r>
             <a:r>
               <a:rPr lang="en-US" sz="2400" dirty="0" err="1" smtClean="0">
@@ -7403,15 +7401,7 @@
             </a:r>
             <a:r>
               <a:rPr lang="en-US" dirty="0" smtClean="0"/>
-              <a:t>, Eclipse, </a:t>
-            </a:r>
-            <a:r>
-              <a:rPr lang="en-US" dirty="0" err="1" smtClean="0"/>
-              <a:t>Netbeans</a:t>
-            </a:r>
-            <a:r>
-              <a:rPr lang="en-US" dirty="0" smtClean="0"/>
-              <a:t>, Ant, Maven</a:t>
+              <a:t>, Eclipse, Ant, Maven</a:t>
             </a:r>
           </a:p>
           <a:p>
@@ -7459,7 +7449,7 @@
             </a:r>
             <a:r>
               <a:rPr lang="en-US" dirty="0" smtClean="0"/>
-              <a:t>: 1 per 75 lines</a:t>
+              <a:t>:  1 per 75 lines</a:t>
             </a:r>
           </a:p>
           <a:p>
@@ -7525,7 +7515,7 @@
             </a:pPr>
             <a:r>
               <a:rPr lang="en-US" dirty="0" smtClean="0"/>
-              <a:t>Inference tools: </a:t>
+              <a:t>Inference tools:  </a:t>
             </a:r>
             <a:r>
               <a:rPr lang="en-US" dirty="0" err="1" smtClean="0"/>
@@ -8602,7 +8592,7 @@
                   <a:srgbClr val="FF0000"/>
                 </a:solidFill>
               </a:rPr>
-              <a:t>a’ or ‘t’=‘t</a:t>
+              <a:t>a’ or ‘1’=‘1</a:t>
             </a:r>
           </a:p>
           <a:p>
@@ -8663,7 +8653,7 @@
                 <a:latin typeface="Courier New" pitchFamily="49" charset="0"/>
                 <a:cs typeface="Courier New" pitchFamily="49" charset="0"/>
               </a:rPr>
-              <a:t>a’ or ‘t’=‘t</a:t>
+              <a:t>a’ or ‘1’=‘1</a:t>
             </a:r>
             <a:r>
               <a:rPr lang="en-US" sz="2400" b="1" dirty="0" smtClean="0">
@@ -9270,12 +9260,26 @@
             <p:ph idx="1"/>
           </p:nvPr>
         </p:nvSpPr>
-        <p:spPr/>
+        <p:spPr>
+          <a:xfrm>
+            <a:off x="457200" y="1600200"/>
+            <a:ext cx="8229600" cy="4525963"/>
+          </a:xfrm>
+        </p:spPr>
         <p:txBody>
           <a:bodyPr/>
           <a:lstStyle/>
           <a:p>
-            <a:endParaRPr lang="en-US" smtClean="0"/>
+            <a:r>
+              <a:rPr lang="en-US" dirty="0" smtClean="0"/>
+              <a:t>Detect SQL injection vulnerability</a:t>
+            </a:r>
+          </a:p>
+          <a:p>
+            <a:r>
+              <a:rPr lang="en-US" dirty="0" smtClean="0"/>
+              <a:t>Guarantee absence of such vulnerabilities</a:t>
+            </a:r>
           </a:p>
         </p:txBody>
       </p:sp>
@@ -11659,10 +11663,22 @@
             </a:r>
           </a:p>
           <a:p>
-            <a:pPr eaLnBrk="1" hangingPunct="1"/>
+            <a:pPr eaLnBrk="1" hangingPunct="1">
+              <a:buClr>
+                <a:schemeClr val="tx1"/>
+              </a:buClr>
+            </a:pPr>
+            <a:r>
+              <a:rPr lang="en-US" dirty="0" smtClean="0">
+                <a:solidFill>
+                  <a:srgbClr val="FF0000"/>
+                </a:solidFill>
+              </a:rPr>
+              <a:t>Checker Framework </a:t>
+            </a:r>
             <a:r>
               <a:rPr lang="en-US" dirty="0" smtClean="0"/>
-              <a:t>Checker Framework for creating type checkers</a:t>
+              <a:t>for creating type checkers</a:t>
             </a:r>
           </a:p>
           <a:p>
@@ -12227,19 +12243,7 @@
             <a:pPr lvl="1"/>
             <a:r>
               <a:rPr lang="en-US" dirty="0" smtClean="0"/>
-              <a:t>If you are </a:t>
-            </a:r>
-            <a:r>
-              <a:rPr lang="en-US" dirty="0" smtClean="0">
-                <a:solidFill>
-                  <a:srgbClr val="FF0000"/>
-                </a:solidFill>
-              </a:rPr>
-              <a:t>very lucky</a:t>
-            </a:r>
-            <a:r>
-              <a:rPr lang="en-US" dirty="0" smtClean="0"/>
-              <a:t>, </a:t>
+              <a:t>If you are very lucky, </a:t>
             </a:r>
             <a:r>
               <a:rPr lang="en-US" dirty="0" smtClean="0">
@@ -12258,19 +12262,7 @@
             <a:pPr lvl="1"/>
             <a:r>
               <a:rPr lang="en-US" dirty="0" smtClean="0"/>
-              <a:t>If you are </a:t>
-            </a:r>
-            <a:r>
-              <a:rPr lang="en-US" dirty="0" smtClean="0">
-                <a:solidFill>
-                  <a:srgbClr val="FF0000"/>
-                </a:solidFill>
-              </a:rPr>
-              <a:t>unlucky</a:t>
-            </a:r>
-            <a:r>
-              <a:rPr lang="en-US" dirty="0" smtClean="0"/>
-              <a:t>, your </a:t>
+              <a:t>If you are unlucky, your </a:t>
             </a:r>
             <a:r>
               <a:rPr lang="en-US" dirty="0" smtClean="0">
@@ -12289,19 +12281,7 @@
             <a:pPr lvl="1"/>
             <a:r>
               <a:rPr lang="en-US" dirty="0" smtClean="0"/>
-              <a:t>If you are </a:t>
-            </a:r>
-            <a:r>
-              <a:rPr lang="en-US" dirty="0" smtClean="0">
-                <a:solidFill>
-                  <a:srgbClr val="FF0000"/>
-                </a:solidFill>
-              </a:rPr>
-              <a:t>very unlucky</a:t>
-            </a:r>
-            <a:r>
-              <a:rPr lang="en-US" dirty="0" smtClean="0"/>
-              <a:t>, </a:t>
+              <a:t>If you are very unlucky, </a:t>
             </a:r>
             <a:r>
               <a:rPr lang="en-US" dirty="0" smtClean="0">
@@ -12324,19 +12304,7 @@
             <a:pPr lvl="1"/>
             <a:r>
               <a:rPr lang="en-US" dirty="0" smtClean="0"/>
-              <a:t>If you are </a:t>
-            </a:r>
-            <a:r>
-              <a:rPr lang="en-US" dirty="0" smtClean="0">
-                <a:solidFill>
-                  <a:srgbClr val="FF0000"/>
-                </a:solidFill>
-              </a:rPr>
-              <a:t>smart</a:t>
-            </a:r>
-            <a:r>
-              <a:rPr lang="en-US" dirty="0" smtClean="0"/>
-              <a:t>, the </a:t>
+              <a:t>If you are smart, the </a:t>
             </a:r>
             <a:r>
               <a:rPr lang="en-US" dirty="0" smtClean="0">
@@ -12667,15 +12635,7 @@
             </a:pPr>
             <a:r>
               <a:rPr lang="en-GB" dirty="0" smtClean="0"/>
-              <a:t>Type checker </a:t>
-            </a:r>
-            <a:r>
-              <a:rPr lang="en-GB" dirty="0" smtClean="0"/>
-              <a:t>warns </a:t>
-            </a:r>
-            <a:r>
-              <a:rPr lang="en-GB" dirty="0" smtClean="0"/>
-              <a:t>about violations (bugs)</a:t>
+              <a:t>Type checker warns about violations (bugs)</a:t>
             </a:r>
             <a:endParaRPr lang="en-US" sz="2000" b="1" dirty="0" smtClean="0">
               <a:latin typeface="Courier New" pitchFamily="49" charset="0"/>
@@ -13101,7 +13061,7 @@
             </a:r>
             <a:r>
               <a:rPr lang="en-US" dirty="0" smtClean="0"/>
-              <a:t> annotation syntax</a:t>
+              <a:t>:  annotations on types</a:t>
             </a:r>
           </a:p>
           <a:p>
@@ -13456,8 +13416,8 @@
         </p:nvSpPr>
         <p:spPr>
           <a:xfrm>
-            <a:off x="457200" y="1831975"/>
-            <a:ext cx="8345714" cy="4551363"/>
+            <a:off x="457200" y="1671911"/>
+            <a:ext cx="8345714" cy="4684439"/>
           </a:xfrm>
         </p:spPr>
         <p:txBody>
@@ -13499,6 +13459,13 @@
             </a:r>
           </a:p>
           <a:p>
+            <a:endParaRPr lang="en-US" sz="700" b="1" dirty="0" smtClean="0">
+              <a:solidFill>
+                <a:srgbClr val="FF0000"/>
+              </a:solidFill>
+            </a:endParaRPr>
+          </a:p>
+          <a:p>
             <a:pPr>
               <a:buClr>
                 <a:schemeClr val="tx1"/>
@@ -13523,6 +13490,14 @@
               <a:rPr lang="en-US" dirty="0" smtClean="0"/>
               <a:t>Improve code structure &amp; maintainability</a:t>
             </a:r>
+          </a:p>
+          <a:p>
+            <a:pPr>
+              <a:buClr>
+                <a:schemeClr val="tx1"/>
+              </a:buClr>
+            </a:pPr>
+            <a:endParaRPr lang="en-US" sz="700" dirty="0" smtClean="0"/>
           </a:p>
           <a:p>
             <a:r>

</xml_diff>